<commit_message>
final changes on pptx
</commit_message>
<xml_diff>
--- a/Vortrag_KE2016_MAVE_SIA.pptx
+++ b/Vortrag_KE2016_MAVE_SIA.pptx
@@ -39,7 +39,7 @@
     <p:sldId id="289" r:id="rId27"/>
   </p:sldIdLst>
   <p:sldSz cx="9144000" cy="6858000" type="screen4x3"/>
-  <p:notesSz cx="6858000" cy="9144000"/>
+  <p:notesSz cx="7099300" cy="10234613"/>
   <p:embeddedFontLst>
     <p:embeddedFont>
       <p:font typeface="AA Zuehlke" panose="02000503060000020004" pitchFamily="2" charset="0"/>
@@ -187,12 +187,12 @@
     </p:ext>
     <p:ext uri="{2D200454-40CA-4A62-9FC3-DE9A4176ACB9}">
       <p15:notesGuideLst xmlns:p15="http://schemas.microsoft.com/office/powerpoint/2012/main">
-        <p15:guide id="1" orient="horz" pos="2880">
+        <p15:guide id="1" orient="horz" pos="3224" userDrawn="1">
           <p15:clr>
             <a:srgbClr val="A4A3A4"/>
           </p15:clr>
         </p15:guide>
-        <p15:guide id="2" pos="2160">
+        <p15:guide id="2" pos="2236" userDrawn="1">
           <p15:clr>
             <a:srgbClr val="A4A3A4"/>
           </p15:clr>
@@ -6822,17 +6822,17 @@
         <p:spPr>
           <a:xfrm>
             <a:off x="0" y="0"/>
-            <a:ext cx="2971800" cy="457200"/>
+            <a:ext cx="3076363" cy="511731"/>
           </a:xfrm>
           <a:prstGeom prst="rect">
             <a:avLst/>
           </a:prstGeom>
         </p:spPr>
         <p:txBody>
-          <a:bodyPr vert="horz" lIns="91440" tIns="45720" rIns="91440" bIns="45720" rtlCol="0"/>
+          <a:bodyPr vert="horz" lIns="99048" tIns="49524" rIns="99048" bIns="49524" rtlCol="0"/>
           <a:lstStyle>
             <a:lvl1pPr algn="l">
-              <a:defRPr sz="1200"/>
+              <a:defRPr sz="1300"/>
             </a:lvl1pPr>
           </a:lstStyle>
           <a:p>
@@ -6854,18 +6854,18 @@
         </p:nvSpPr>
         <p:spPr>
           <a:xfrm>
-            <a:off x="3884613" y="0"/>
-            <a:ext cx="2971800" cy="457200"/>
+            <a:off x="4021294" y="0"/>
+            <a:ext cx="3076363" cy="511731"/>
           </a:xfrm>
           <a:prstGeom prst="rect">
             <a:avLst/>
           </a:prstGeom>
         </p:spPr>
         <p:txBody>
-          <a:bodyPr vert="horz" lIns="91440" tIns="45720" rIns="91440" bIns="45720" rtlCol="0"/>
+          <a:bodyPr vert="horz" lIns="99048" tIns="49524" rIns="99048" bIns="49524" rtlCol="0"/>
           <a:lstStyle>
             <a:lvl1pPr algn="r">
-              <a:defRPr sz="1200"/>
+              <a:defRPr sz="1300"/>
             </a:lvl1pPr>
           </a:lstStyle>
           <a:p>
@@ -6873,7 +6873,7 @@
               <a:rPr lang="de-DE" smtClean="0">
                 <a:latin typeface="AA Zuehlke" pitchFamily="2" charset="0"/>
               </a:rPr>
-              <a:t>09.06.2016</a:t>
+              <a:t>14.06.2016</a:t>
             </a:fld>
             <a:endParaRPr lang="de-DE">
               <a:latin typeface="AA Zuehlke" pitchFamily="2" charset="0"/>
@@ -6893,18 +6893,18 @@
         </p:nvSpPr>
         <p:spPr>
           <a:xfrm>
-            <a:off x="0" y="8685213"/>
-            <a:ext cx="2971800" cy="457200"/>
+            <a:off x="0" y="9721106"/>
+            <a:ext cx="3076363" cy="511731"/>
           </a:xfrm>
           <a:prstGeom prst="rect">
             <a:avLst/>
           </a:prstGeom>
         </p:spPr>
         <p:txBody>
-          <a:bodyPr vert="horz" lIns="91440" tIns="45720" rIns="91440" bIns="45720" rtlCol="0" anchor="b"/>
+          <a:bodyPr vert="horz" lIns="99048" tIns="49524" rIns="99048" bIns="49524" rtlCol="0" anchor="b"/>
           <a:lstStyle>
             <a:lvl1pPr algn="l">
-              <a:defRPr sz="1200"/>
+              <a:defRPr sz="1300"/>
             </a:lvl1pPr>
           </a:lstStyle>
           <a:p>
@@ -6926,18 +6926,18 @@
         </p:nvSpPr>
         <p:spPr>
           <a:xfrm>
-            <a:off x="3884613" y="8685213"/>
-            <a:ext cx="2971800" cy="457200"/>
+            <a:off x="4021294" y="9721106"/>
+            <a:ext cx="3076363" cy="511731"/>
           </a:xfrm>
           <a:prstGeom prst="rect">
             <a:avLst/>
           </a:prstGeom>
         </p:spPr>
         <p:txBody>
-          <a:bodyPr vert="horz" lIns="91440" tIns="45720" rIns="91440" bIns="45720" rtlCol="0" anchor="b"/>
+          <a:bodyPr vert="horz" lIns="99048" tIns="49524" rIns="99048" bIns="49524" rtlCol="0" anchor="b"/>
           <a:lstStyle>
             <a:lvl1pPr algn="r">
-              <a:defRPr sz="1200"/>
+              <a:defRPr sz="1300"/>
             </a:lvl1pPr>
           </a:lstStyle>
           <a:p>
@@ -6999,17 +6999,17 @@
         <p:spPr>
           <a:xfrm>
             <a:off x="0" y="0"/>
-            <a:ext cx="2971800" cy="457200"/>
+            <a:ext cx="3076363" cy="511731"/>
           </a:xfrm>
           <a:prstGeom prst="rect">
             <a:avLst/>
           </a:prstGeom>
         </p:spPr>
         <p:txBody>
-          <a:bodyPr vert="horz" lIns="91440" tIns="45720" rIns="91440" bIns="45720" rtlCol="0"/>
+          <a:bodyPr vert="horz" lIns="99048" tIns="49524" rIns="99048" bIns="49524" rtlCol="0"/>
           <a:lstStyle>
             <a:lvl1pPr algn="l">
-              <a:defRPr sz="1200">
+              <a:defRPr sz="1300">
                 <a:latin typeface="AA Zuehlke" pitchFamily="2" charset="0"/>
               </a:defRPr>
             </a:lvl1pPr>
@@ -7031,18 +7031,18 @@
         </p:nvSpPr>
         <p:spPr>
           <a:xfrm>
-            <a:off x="3884613" y="0"/>
-            <a:ext cx="2971800" cy="457200"/>
+            <a:off x="4021294" y="0"/>
+            <a:ext cx="3076363" cy="511731"/>
           </a:xfrm>
           <a:prstGeom prst="rect">
             <a:avLst/>
           </a:prstGeom>
         </p:spPr>
         <p:txBody>
-          <a:bodyPr vert="horz" lIns="91440" tIns="45720" rIns="91440" bIns="45720" rtlCol="0"/>
+          <a:bodyPr vert="horz" lIns="99048" tIns="49524" rIns="99048" bIns="49524" rtlCol="0"/>
           <a:lstStyle>
             <a:lvl1pPr algn="r">
-              <a:defRPr sz="1200">
+              <a:defRPr sz="1300">
                 <a:latin typeface="AA Zuehlke" pitchFamily="2" charset="0"/>
               </a:defRPr>
             </a:lvl1pPr>
@@ -7051,7 +7051,7 @@
             <a:fld id="{A6966AE6-B72D-4967-9CA3-8469D2863705}" type="datetimeFigureOut">
               <a:rPr lang="en-US" smtClean="0"/>
               <a:pPr/>
-              <a:t>6/9/2016</a:t>
+              <a:t>6/14/2016</a:t>
             </a:fld>
             <a:endParaRPr lang="en-US" dirty="0"/>
           </a:p>
@@ -7069,8 +7069,8 @@
         </p:nvSpPr>
         <p:spPr>
           <a:xfrm>
-            <a:off x="1143000" y="685800"/>
-            <a:ext cx="4572000" cy="3429000"/>
+            <a:off x="992188" y="768350"/>
+            <a:ext cx="5114925" cy="3836988"/>
           </a:xfrm>
           <a:prstGeom prst="rect">
             <a:avLst/>
@@ -7083,7 +7083,7 @@
           </a:ln>
         </p:spPr>
         <p:txBody>
-          <a:bodyPr vert="horz" lIns="91440" tIns="45720" rIns="91440" bIns="45720" rtlCol="0" anchor="ctr"/>
+          <a:bodyPr vert="horz" lIns="99048" tIns="49524" rIns="99048" bIns="49524" rtlCol="0" anchor="ctr"/>
           <a:lstStyle/>
           <a:p>
             <a:endParaRPr lang="en-US" dirty="0"/>
@@ -7102,15 +7102,15 @@
         </p:nvSpPr>
         <p:spPr>
           <a:xfrm>
-            <a:off x="685800" y="4343400"/>
-            <a:ext cx="5486400" cy="4114800"/>
+            <a:off x="709930" y="4861441"/>
+            <a:ext cx="5679440" cy="4605576"/>
           </a:xfrm>
           <a:prstGeom prst="rect">
             <a:avLst/>
           </a:prstGeom>
         </p:spPr>
         <p:txBody>
-          <a:bodyPr vert="horz" lIns="91440" tIns="45720" rIns="91440" bIns="45720" rtlCol="0">
+          <a:bodyPr vert="horz" lIns="99048" tIns="49524" rIns="99048" bIns="49524" rtlCol="0">
             <a:normAutofit/>
           </a:bodyPr>
           <a:lstStyle/>
@@ -7164,18 +7164,18 @@
         </p:nvSpPr>
         <p:spPr>
           <a:xfrm>
-            <a:off x="0" y="8685213"/>
-            <a:ext cx="2971800" cy="457200"/>
+            <a:off x="0" y="9721106"/>
+            <a:ext cx="3076363" cy="511731"/>
           </a:xfrm>
           <a:prstGeom prst="rect">
             <a:avLst/>
           </a:prstGeom>
         </p:spPr>
         <p:txBody>
-          <a:bodyPr vert="horz" lIns="91440" tIns="45720" rIns="91440" bIns="45720" rtlCol="0" anchor="b"/>
+          <a:bodyPr vert="horz" lIns="99048" tIns="49524" rIns="99048" bIns="49524" rtlCol="0" anchor="b"/>
           <a:lstStyle>
             <a:lvl1pPr algn="l">
-              <a:defRPr sz="1200">
+              <a:defRPr sz="1300">
                 <a:latin typeface="AA Zuehlke" pitchFamily="2" charset="0"/>
               </a:defRPr>
             </a:lvl1pPr>
@@ -7197,18 +7197,18 @@
         </p:nvSpPr>
         <p:spPr>
           <a:xfrm>
-            <a:off x="3884613" y="8685213"/>
-            <a:ext cx="2971800" cy="457200"/>
+            <a:off x="4021294" y="9721106"/>
+            <a:ext cx="3076363" cy="511731"/>
           </a:xfrm>
           <a:prstGeom prst="rect">
             <a:avLst/>
           </a:prstGeom>
         </p:spPr>
         <p:txBody>
-          <a:bodyPr vert="horz" lIns="91440" tIns="45720" rIns="91440" bIns="45720" rtlCol="0" anchor="b"/>
+          <a:bodyPr vert="horz" lIns="99048" tIns="49524" rIns="99048" bIns="49524" rtlCol="0" anchor="b"/>
           <a:lstStyle>
             <a:lvl1pPr algn="r">
-              <a:defRPr sz="1200">
+              <a:defRPr sz="1300">
                 <a:latin typeface="AA Zuehlke" pitchFamily="2" charset="0"/>
               </a:defRPr>
             </a:lvl1pPr>
@@ -7375,7 +7375,7 @@
               <a:t>Originaltitel: </a:t>
             </a:r>
             <a:r>
-              <a:rPr lang="de-DE" sz="1200" dirty="0" smtClean="0"/>
+              <a:rPr lang="de-DE" sz="1300" dirty="0"/>
               <a:t>Automatisierte Akzeptanztests bei Single-Page-Applikationen mit Angular, Angular 2 und Aurelia</a:t>
             </a:r>
             <a:endParaRPr lang="de-DE" dirty="0"/>
@@ -7464,69 +7464,53 @@
           <a:lstStyle/>
           <a:p>
             <a:r>
-              <a:rPr lang="de-DE" sz="1400" b="1" dirty="0" smtClean="0">
-                <a:latin typeface="AA Zuehlke" pitchFamily="2" charset="0"/>
-              </a:rPr>
+              <a:rPr lang="de-DE" sz="1500" b="1" dirty="0"/>
               <a:t>Business Rules</a:t>
             </a:r>
           </a:p>
           <a:p>
-            <a:pPr marL="342900" indent="-342900">
+            <a:pPr marL="371429" indent="-371429">
               <a:buFont typeface="Arial" panose="020B0604020202020204" pitchFamily="34" charset="0"/>
               <a:buChar char="•"/>
             </a:pPr>
             <a:r>
-              <a:rPr lang="de-DE" sz="1200" dirty="0" smtClean="0">
-                <a:latin typeface="AA Zuehlke" pitchFamily="2" charset="0"/>
-              </a:rPr>
+              <a:rPr lang="de-DE" sz="1300" dirty="0"/>
               <a:t>Erste beiden Wörter mit Komma getrennt hinten anhängen</a:t>
             </a:r>
           </a:p>
           <a:p>
-            <a:pPr marL="342900" indent="-342900">
+            <a:pPr marL="371429" indent="-371429">
               <a:buFont typeface="Arial" panose="020B0604020202020204" pitchFamily="34" charset="0"/>
               <a:buChar char="•"/>
             </a:pPr>
             <a:r>
-              <a:rPr lang="de-DE" sz="1200" dirty="0" smtClean="0">
-                <a:latin typeface="AA Zuehlke" pitchFamily="2" charset="0"/>
-              </a:rPr>
+              <a:rPr lang="de-DE" sz="1300" dirty="0"/>
               <a:t>Falles Eingabe mit Fragezeichen endet, „</a:t>
             </a:r>
             <a:r>
-              <a:rPr lang="de-DE" sz="1200" dirty="0" err="1" smtClean="0">
-                <a:latin typeface="AA Zuehlke" pitchFamily="2" charset="0"/>
-              </a:rPr>
+              <a:rPr lang="de-DE" sz="1300" dirty="0" err="1"/>
               <a:t>Hmmm</a:t>
             </a:r>
             <a:r>
-              <a:rPr lang="de-DE" sz="1200" dirty="0" smtClean="0">
-                <a:latin typeface="AA Zuehlke" pitchFamily="2" charset="0"/>
-              </a:rPr>
+              <a:rPr lang="de-DE" sz="1300" dirty="0"/>
               <a:t>…?“ anhängen</a:t>
             </a:r>
           </a:p>
           <a:p>
-            <a:pPr marL="342900" indent="-342900">
+            <a:pPr marL="371429" indent="-371429">
               <a:buFont typeface="Arial" panose="020B0604020202020204" pitchFamily="34" charset="0"/>
               <a:buChar char="•"/>
             </a:pPr>
             <a:r>
-              <a:rPr lang="de-DE" sz="1200" dirty="0" smtClean="0">
-                <a:latin typeface="AA Zuehlke" pitchFamily="2" charset="0"/>
-              </a:rPr>
+              <a:rPr lang="de-DE" sz="1300" dirty="0"/>
               <a:t>„</a:t>
             </a:r>
             <a:r>
-              <a:rPr lang="de-DE" sz="1200" dirty="0" err="1" smtClean="0">
-                <a:latin typeface="AA Zuehlke" pitchFamily="2" charset="0"/>
-              </a:rPr>
+              <a:rPr lang="de-DE" sz="1300" dirty="0" err="1"/>
               <a:t>yes</a:t>
             </a:r>
             <a:r>
-              <a:rPr lang="de-DE" sz="1200" dirty="0" smtClean="0">
-                <a:latin typeface="AA Zuehlke" pitchFamily="2" charset="0"/>
-              </a:rPr>
+              <a:rPr lang="de-DE" sz="1300" dirty="0"/>
               <a:t>…“ hinten anhängen</a:t>
             </a:r>
           </a:p>
@@ -7624,7 +7608,7 @@
             <a:endParaRPr lang="de-DE" baseline="0" dirty="0" smtClean="0"/>
           </a:p>
           <a:p>
-            <a:pPr marL="171450" indent="-171450">
+            <a:pPr marL="185715" indent="-185715">
               <a:buFont typeface="Arial" panose="020B0604020202020204" pitchFamily="34" charset="0"/>
               <a:buChar char="•"/>
             </a:pPr>
@@ -7638,7 +7622,7 @@
             </a:r>
           </a:p>
           <a:p>
-            <a:pPr marL="171450" indent="-171450">
+            <a:pPr marL="185715" indent="-185715">
               <a:buFont typeface="Arial" panose="020B0604020202020204" pitchFamily="34" charset="0"/>
               <a:buChar char="•"/>
             </a:pPr>
@@ -7648,7 +7632,7 @@
             </a:r>
           </a:p>
           <a:p>
-            <a:pPr marL="171450" indent="-171450">
+            <a:pPr marL="185715" indent="-185715">
               <a:buFont typeface="Arial" panose="020B0604020202020204" pitchFamily="34" charset="0"/>
               <a:buChar char="•"/>
             </a:pPr>
@@ -7666,24 +7650,20 @@
             </a:r>
           </a:p>
           <a:p>
-            <a:pPr marL="171450" indent="-171450">
+            <a:pPr marL="185715" indent="-185715">
               <a:buFont typeface="Arial" panose="020B0604020202020204" pitchFamily="34" charset="0"/>
               <a:buChar char="•"/>
             </a:pPr>
             <a:endParaRPr lang="de-DE" baseline="0" dirty="0" smtClean="0"/>
           </a:p>
           <a:p>
-            <a:pPr marL="0" indent="0">
-              <a:buFont typeface="Arial" panose="020B0604020202020204" pitchFamily="34" charset="0"/>
-              <a:buNone/>
-            </a:pPr>
             <a:r>
               <a:rPr lang="de-DE" baseline="0" dirty="0" smtClean="0"/>
               <a:t># Szenario</a:t>
             </a:r>
           </a:p>
           <a:p>
-            <a:pPr marL="171450" indent="-171450">
+            <a:pPr marL="185715" indent="-185715">
               <a:buFont typeface="Arial" panose="020B0604020202020204" pitchFamily="34" charset="0"/>
               <a:buChar char="•"/>
             </a:pPr>
@@ -7701,7 +7681,7 @@
             </a:r>
           </a:p>
           <a:p>
-            <a:pPr marL="171450" indent="-171450">
+            <a:pPr marL="185715" indent="-185715">
               <a:buFont typeface="Arial" panose="020B0604020202020204" pitchFamily="34" charset="0"/>
               <a:buChar char="•"/>
             </a:pPr>
@@ -7711,7 +7691,7 @@
             </a:r>
           </a:p>
           <a:p>
-            <a:pPr marL="171450" indent="-171450">
+            <a:pPr marL="185715" indent="-185715">
               <a:buFont typeface="Arial" panose="020B0604020202020204" pitchFamily="34" charset="0"/>
               <a:buChar char="•"/>
             </a:pPr>
@@ -7721,17 +7701,13 @@
             </a:r>
           </a:p>
           <a:p>
-            <a:pPr marL="171450" indent="-171450">
+            <a:pPr marL="185715" indent="-185715">
               <a:buFont typeface="Arial" panose="020B0604020202020204" pitchFamily="34" charset="0"/>
               <a:buChar char="•"/>
             </a:pPr>
             <a:endParaRPr lang="de-DE" baseline="0" dirty="0" smtClean="0"/>
           </a:p>
           <a:p>
-            <a:pPr marL="0" indent="0">
-              <a:buFont typeface="Arial" panose="020B0604020202020204" pitchFamily="34" charset="0"/>
-              <a:buNone/>
-            </a:pPr>
             <a:r>
               <a:rPr lang="de-DE" baseline="0" dirty="0" smtClean="0"/>
               <a:t># </a:t>
@@ -7743,7 +7719,7 @@
             <a:endParaRPr lang="de-DE" baseline="0" dirty="0" smtClean="0"/>
           </a:p>
           <a:p>
-            <a:pPr marL="171450" indent="-171450">
+            <a:pPr marL="185715" indent="-185715">
               <a:buFont typeface="Arial" panose="020B0604020202020204" pitchFamily="34" charset="0"/>
               <a:buChar char="•"/>
             </a:pPr>
@@ -7765,7 +7741,7 @@
             </a:r>
           </a:p>
           <a:p>
-            <a:pPr marL="171450" indent="-171450">
+            <a:pPr marL="185715" indent="-185715">
               <a:buFont typeface="Arial" panose="020B0604020202020204" pitchFamily="34" charset="0"/>
               <a:buChar char="•"/>
             </a:pPr>
@@ -7779,7 +7755,7 @@
             </a:r>
           </a:p>
           <a:p>
-            <a:pPr marL="171450" indent="-171450">
+            <a:pPr marL="185715" indent="-185715">
               <a:buFont typeface="Arial" panose="020B0604020202020204" pitchFamily="34" charset="0"/>
               <a:buChar char="•"/>
             </a:pPr>
@@ -7801,17 +7777,13 @@
             </a:r>
           </a:p>
           <a:p>
-            <a:pPr marL="171450" indent="-171450">
+            <a:pPr marL="185715" indent="-185715">
               <a:buFont typeface="Arial" panose="020B0604020202020204" pitchFamily="34" charset="0"/>
               <a:buChar char="•"/>
             </a:pPr>
             <a:endParaRPr lang="de-DE" baseline="0" dirty="0" smtClean="0"/>
           </a:p>
           <a:p>
-            <a:pPr marL="0" indent="0">
-              <a:buFont typeface="Arial" panose="020B0604020202020204" pitchFamily="34" charset="0"/>
-              <a:buNone/>
-            </a:pPr>
             <a:r>
               <a:rPr lang="de-DE" baseline="0" dirty="0" smtClean="0"/>
               <a:t># noch nicht alle Sprachfeatures in Cucumber.js unterstützt</a:t>
@@ -7903,21 +7875,7 @@
           <a:bodyPr/>
           <a:lstStyle/>
           <a:p>
-            <a:pPr marL="0" marR="0" indent="0" algn="l" defTabSz="914400" rtl="0" eaLnBrk="1" fontAlgn="auto" latinLnBrk="0" hangingPunct="1">
-              <a:lnSpc>
-                <a:spcPct val="100000"/>
-              </a:lnSpc>
-              <a:spcBef>
-                <a:spcPts val="0"/>
-              </a:spcBef>
-              <a:spcAft>
-                <a:spcPts val="0"/>
-              </a:spcAft>
-              <a:buClrTx/>
-              <a:buSzTx/>
-              <a:buFont typeface="Arial" panose="020B0604020202020204" pitchFamily="34" charset="0"/>
-              <a:buNone/>
-              <a:tabLst/>
+            <a:pPr defTabSz="990478">
               <a:defRPr/>
             </a:pPr>
             <a:r>
@@ -7926,21 +7884,7 @@
             </a:r>
           </a:p>
           <a:p>
-            <a:pPr marL="0" marR="0" indent="0" algn="l" defTabSz="914400" rtl="0" eaLnBrk="1" fontAlgn="auto" latinLnBrk="0" hangingPunct="1">
-              <a:lnSpc>
-                <a:spcPct val="100000"/>
-              </a:lnSpc>
-              <a:spcBef>
-                <a:spcPts val="0"/>
-              </a:spcBef>
-              <a:spcAft>
-                <a:spcPts val="0"/>
-              </a:spcAft>
-              <a:buClrTx/>
-              <a:buSzTx/>
-              <a:buFont typeface="Arial" panose="020B0604020202020204" pitchFamily="34" charset="0"/>
-              <a:buNone/>
-              <a:tabLst/>
+            <a:pPr defTabSz="990478">
               <a:defRPr/>
             </a:pPr>
             <a:r>
@@ -7957,21 +7901,7 @@
             </a:r>
           </a:p>
           <a:p>
-            <a:pPr marL="0" marR="0" indent="0" algn="l" defTabSz="914400" rtl="0" eaLnBrk="1" fontAlgn="auto" latinLnBrk="0" hangingPunct="1">
-              <a:lnSpc>
-                <a:spcPct val="100000"/>
-              </a:lnSpc>
-              <a:spcBef>
-                <a:spcPts val="0"/>
-              </a:spcBef>
-              <a:spcAft>
-                <a:spcPts val="0"/>
-              </a:spcAft>
-              <a:buClrTx/>
-              <a:buSzTx/>
-              <a:buFont typeface="Arial" panose="020B0604020202020204" pitchFamily="34" charset="0"/>
-              <a:buNone/>
-              <a:tabLst/>
+            <a:pPr defTabSz="990478">
               <a:defRPr/>
             </a:pPr>
             <a:r>
@@ -8065,15 +7995,7 @@
           <a:bodyPr/>
           <a:lstStyle/>
           <a:p>
-            <a:endParaRPr lang="de-DE" sz="1200" kern="1200" dirty="0" smtClean="0">
-              <a:solidFill>
-                <a:schemeClr val="tx1"/>
-              </a:solidFill>
-              <a:effectLst/>
-              <a:latin typeface="AA Zuehlke" pitchFamily="2" charset="0"/>
-              <a:ea typeface="+mn-ea"/>
-              <a:cs typeface="+mn-cs"/>
-            </a:endParaRPr>
+            <a:endParaRPr lang="de-DE" sz="1300" dirty="0"/>
           </a:p>
         </p:txBody>
       </p:sp>
@@ -8158,10 +8080,6 @@
           <a:bodyPr/>
           <a:lstStyle/>
           <a:p>
-            <a:pPr marL="0" lvl="0" indent="0">
-              <a:buFont typeface="Arial" panose="020B0604020202020204" pitchFamily="34" charset="0"/>
-              <a:buNone/>
-            </a:pPr>
             <a:r>
               <a:rPr lang="de-DE" baseline="0" dirty="0" smtClean="0"/>
               <a:t># Beschreibung in 3-Ebenen nach Gojko Adzic: Business Rule Level, UI Workflow Level (was macht User in UI), Technical Acitvity Level (technische Schritte)</a:t>
@@ -8253,21 +8171,7 @@
           <a:bodyPr/>
           <a:lstStyle/>
           <a:p>
-            <a:pPr marL="0" marR="0" indent="0" algn="l" defTabSz="914400" rtl="0" eaLnBrk="1" fontAlgn="auto" latinLnBrk="0" hangingPunct="1">
-              <a:lnSpc>
-                <a:spcPct val="100000"/>
-              </a:lnSpc>
-              <a:spcBef>
-                <a:spcPts val="0"/>
-              </a:spcBef>
-              <a:spcAft>
-                <a:spcPts val="0"/>
-              </a:spcAft>
-              <a:buClrTx/>
-              <a:buSzTx/>
-              <a:buFont typeface="Arial" panose="020B0604020202020204" pitchFamily="34" charset="0"/>
-              <a:buNone/>
-              <a:tabLst/>
+            <a:pPr defTabSz="990478">
               <a:defRPr/>
             </a:pPr>
             <a:r>
@@ -8276,21 +8180,7 @@
             </a:r>
           </a:p>
           <a:p>
-            <a:pPr marL="0" marR="0" indent="0" algn="l" defTabSz="914400" rtl="0" eaLnBrk="1" fontAlgn="auto" latinLnBrk="0" hangingPunct="1">
-              <a:lnSpc>
-                <a:spcPct val="100000"/>
-              </a:lnSpc>
-              <a:spcBef>
-                <a:spcPts val="0"/>
-              </a:spcBef>
-              <a:spcAft>
-                <a:spcPts val="0"/>
-              </a:spcAft>
-              <a:buClrTx/>
-              <a:buSzTx/>
-              <a:buFont typeface="Arial" panose="020B0604020202020204" pitchFamily="34" charset="0"/>
-              <a:buNone/>
-              <a:tabLst/>
+            <a:pPr defTabSz="990478">
               <a:defRPr/>
             </a:pPr>
             <a:r>
@@ -8307,21 +8197,7 @@
             </a:r>
           </a:p>
           <a:p>
-            <a:pPr marL="0" marR="0" indent="0" algn="l" defTabSz="914400" rtl="0" eaLnBrk="1" fontAlgn="auto" latinLnBrk="0" hangingPunct="1">
-              <a:lnSpc>
-                <a:spcPct val="100000"/>
-              </a:lnSpc>
-              <a:spcBef>
-                <a:spcPts val="0"/>
-              </a:spcBef>
-              <a:spcAft>
-                <a:spcPts val="0"/>
-              </a:spcAft>
-              <a:buClrTx/>
-              <a:buSzTx/>
-              <a:buFont typeface="Arial" panose="020B0604020202020204" pitchFamily="34" charset="0"/>
-              <a:buNone/>
-              <a:tabLst/>
+            <a:pPr defTabSz="990478">
               <a:defRPr/>
             </a:pPr>
             <a:r>
@@ -8415,10 +8291,6 @@
           <a:bodyPr/>
           <a:lstStyle/>
           <a:p>
-            <a:pPr marL="0" lvl="0" indent="0">
-              <a:buFont typeface="Arial" panose="020B0604020202020204" pitchFamily="34" charset="0"/>
-              <a:buNone/>
-            </a:pPr>
             <a:r>
               <a:rPr lang="de-DE" baseline="0" dirty="0" smtClean="0"/>
               <a:t># Beschreibung in 3-Ebenen nach Gojko Adzic: Business Rule Level, UI Workflow Level (was macht User in UI), Technical Acitvity Level (technische Schritte)</a:t>
@@ -8634,9 +8506,7 @@
           <a:bodyPr/>
           <a:lstStyle/>
           <a:p>
-            <a:endParaRPr lang="de-DE" sz="1200" dirty="0" smtClean="0">
-              <a:latin typeface="AA Zuehlke" pitchFamily="2" charset="0"/>
-            </a:endParaRPr>
+            <a:endParaRPr lang="de-DE" sz="1300" dirty="0"/>
           </a:p>
         </p:txBody>
       </p:sp>
@@ -8721,10 +8591,6 @@
           <a:bodyPr/>
           <a:lstStyle/>
           <a:p>
-            <a:pPr marL="0" lvl="0" indent="0">
-              <a:buFont typeface="Arial" panose="020B0604020202020204" pitchFamily="34" charset="0"/>
-              <a:buNone/>
-            </a:pPr>
             <a:r>
               <a:rPr lang="de-DE" baseline="0" dirty="0" smtClean="0"/>
               <a:t># Beschreibung in 3-Ebenen nach Gojko Adzic: Business Rule Level, UI Workflow Level (was macht User in UI), Technical Acitvity Level (technische Schritte)</a:t>
@@ -8987,10 +8853,6 @@
           <a:bodyPr/>
           <a:lstStyle/>
           <a:p>
-            <a:pPr marL="0" lvl="0" indent="0">
-              <a:buFont typeface="Arial" panose="020B0604020202020204" pitchFamily="34" charset="0"/>
-              <a:buNone/>
-            </a:pPr>
             <a:r>
               <a:rPr lang="de-DE" baseline="0" dirty="0" smtClean="0"/>
               <a:t># Beschreibung in 3-Ebenen nach Gojko Adzic: Business Rule Level, UI Workflow Level (was macht User in UI), Technical Acitvity Level (technische Schritte)</a:t>
@@ -9167,21 +9029,7 @@
           <a:bodyPr/>
           <a:lstStyle/>
           <a:p>
-            <a:pPr marL="0" marR="0" indent="0" algn="l" defTabSz="914400" rtl="0" eaLnBrk="1" fontAlgn="auto" latinLnBrk="0" hangingPunct="1">
-              <a:lnSpc>
-                <a:spcPct val="100000"/>
-              </a:lnSpc>
-              <a:spcBef>
-                <a:spcPts val="0"/>
-              </a:spcBef>
-              <a:spcAft>
-                <a:spcPts val="0"/>
-              </a:spcAft>
-              <a:buClrTx/>
-              <a:buSzTx/>
-              <a:buFontTx/>
-              <a:buNone/>
-              <a:tabLst/>
+            <a:pPr defTabSz="990478">
               <a:defRPr/>
             </a:pPr>
             <a:r>
@@ -9190,30 +9038,12 @@
             </a:r>
           </a:p>
           <a:p>
-            <a:pPr marL="0" marR="0" indent="0" algn="l" defTabSz="914400" rtl="0" eaLnBrk="1" fontAlgn="auto" latinLnBrk="0" hangingPunct="1">
-              <a:lnSpc>
-                <a:spcPct val="100000"/>
-              </a:lnSpc>
-              <a:spcBef>
-                <a:spcPts val="0"/>
-              </a:spcBef>
-              <a:spcAft>
-                <a:spcPts val="0"/>
-              </a:spcAft>
-              <a:buClrTx/>
-              <a:buSzTx/>
-              <a:buFontTx/>
-              <a:buNone/>
-              <a:tabLst/>
+            <a:pPr defTabSz="990478">
               <a:defRPr/>
             </a:pPr>
             <a:endParaRPr lang="de-DE" dirty="0" smtClean="0"/>
           </a:p>
           <a:p>
-            <a:pPr marL="0" indent="0">
-              <a:buFont typeface="Arial" panose="020B0604020202020204" pitchFamily="34" charset="0"/>
-              <a:buNone/>
-            </a:pPr>
             <a:r>
               <a:rPr lang="de-DE" dirty="0" smtClean="0"/>
               <a:t># Klassische</a:t>
@@ -9224,7 +9054,7 @@
             </a:r>
           </a:p>
           <a:p>
-            <a:pPr marL="171450" lvl="0" indent="-171450">
+            <a:pPr marL="185715" indent="-185715">
               <a:buFont typeface="Arial" panose="020B0604020202020204" pitchFamily="34" charset="0"/>
               <a:buChar char="•"/>
             </a:pPr>
@@ -9234,7 +9064,7 @@
             </a:r>
           </a:p>
           <a:p>
-            <a:pPr marL="171450" lvl="0" indent="-171450">
+            <a:pPr marL="185715" indent="-185715">
               <a:buFont typeface="Arial" panose="020B0604020202020204" pitchFamily="34" charset="0"/>
               <a:buChar char="•"/>
             </a:pPr>
@@ -9244,7 +9074,7 @@
             </a:r>
           </a:p>
           <a:p>
-            <a:pPr marL="171450" lvl="0" indent="-171450">
+            <a:pPr marL="185715" indent="-185715">
               <a:buFont typeface="Arial" panose="020B0604020202020204" pitchFamily="34" charset="0"/>
               <a:buChar char="•"/>
             </a:pPr>
@@ -9254,24 +9084,20 @@
             </a:r>
           </a:p>
           <a:p>
-            <a:pPr marL="171450" lvl="0" indent="-171450">
+            <a:pPr marL="185715" indent="-185715">
               <a:buFont typeface="Arial" panose="020B0604020202020204" pitchFamily="34" charset="0"/>
               <a:buChar char="•"/>
             </a:pPr>
             <a:endParaRPr lang="de-DE" baseline="0" dirty="0" smtClean="0"/>
           </a:p>
           <a:p>
-            <a:pPr marL="0" indent="0">
-              <a:buFont typeface="Arial" panose="020B0604020202020204" pitchFamily="34" charset="0"/>
-              <a:buNone/>
-            </a:pPr>
             <a:r>
               <a:rPr lang="de-DE" baseline="0" dirty="0" smtClean="0"/>
               <a:t># AJAX als Problemlöser (vor ca. 10 Jahren)</a:t>
             </a:r>
           </a:p>
           <a:p>
-            <a:pPr marL="171450" lvl="0" indent="-171450">
+            <a:pPr marL="185715" indent="-185715">
               <a:buFont typeface="Arial" panose="020B0604020202020204" pitchFamily="34" charset="0"/>
               <a:buChar char="•"/>
             </a:pPr>
@@ -9281,7 +9107,7 @@
             </a:r>
           </a:p>
           <a:p>
-            <a:pPr marL="171450" lvl="0" indent="-171450">
+            <a:pPr marL="185715" indent="-185715">
               <a:buFont typeface="Arial" panose="020B0604020202020204" pitchFamily="34" charset="0"/>
               <a:buChar char="•"/>
             </a:pPr>
@@ -9291,7 +9117,7 @@
             </a:r>
           </a:p>
           <a:p>
-            <a:pPr marL="171450" lvl="0" indent="-171450">
+            <a:pPr marL="185715" indent="-185715">
               <a:buFont typeface="Arial" panose="020B0604020202020204" pitchFamily="34" charset="0"/>
               <a:buChar char="•"/>
             </a:pPr>
@@ -9301,24 +9127,20 @@
             </a:r>
           </a:p>
           <a:p>
-            <a:pPr marL="171450" lvl="0" indent="-171450">
+            <a:pPr marL="185715" indent="-185715">
               <a:buFont typeface="Arial" panose="020B0604020202020204" pitchFamily="34" charset="0"/>
               <a:buChar char="•"/>
             </a:pPr>
             <a:endParaRPr lang="de-DE" baseline="0" dirty="0" smtClean="0"/>
           </a:p>
           <a:p>
-            <a:pPr marL="0" indent="0">
-              <a:buFont typeface="Arial" panose="020B0604020202020204" pitchFamily="34" charset="0"/>
-              <a:buNone/>
-            </a:pPr>
             <a:r>
               <a:rPr lang="de-DE" baseline="0" dirty="0" smtClean="0"/>
               <a:t># SPA</a:t>
             </a:r>
           </a:p>
           <a:p>
-            <a:pPr marL="171450" lvl="0" indent="-171450">
+            <a:pPr marL="185715" indent="-185715">
               <a:buFont typeface="Arial" panose="020B0604020202020204" pitchFamily="34" charset="0"/>
               <a:buChar char="•"/>
             </a:pPr>
@@ -9328,7 +9150,7 @@
             </a:r>
           </a:p>
           <a:p>
-            <a:pPr marL="171450" lvl="0" indent="-171450">
+            <a:pPr marL="185715" indent="-185715">
               <a:buFont typeface="Arial" panose="020B0604020202020204" pitchFamily="34" charset="0"/>
               <a:buChar char="•"/>
             </a:pPr>
@@ -9338,7 +9160,7 @@
             </a:r>
           </a:p>
           <a:p>
-            <a:pPr marL="171450" lvl="0" indent="-171450">
+            <a:pPr marL="185715" indent="-185715">
               <a:buFont typeface="Arial" panose="020B0604020202020204" pitchFamily="34" charset="0"/>
               <a:buChar char="•"/>
             </a:pPr>
@@ -9348,7 +9170,7 @@
             </a:r>
           </a:p>
           <a:p>
-            <a:pPr marL="171450" lvl="0" indent="-171450">
+            <a:pPr marL="185715" indent="-185715">
               <a:buFont typeface="Arial" panose="020B0604020202020204" pitchFamily="34" charset="0"/>
               <a:buChar char="•"/>
             </a:pPr>
@@ -9358,21 +9180,9 @@
             </a:r>
           </a:p>
           <a:p>
-            <a:pPr marL="171450" marR="0" lvl="0" indent="-171450" algn="l" defTabSz="914400" rtl="0" eaLnBrk="1" fontAlgn="auto" latinLnBrk="0" hangingPunct="1">
-              <a:lnSpc>
-                <a:spcPct val="100000"/>
-              </a:lnSpc>
-              <a:spcBef>
-                <a:spcPts val="0"/>
-              </a:spcBef>
-              <a:spcAft>
-                <a:spcPts val="0"/>
-              </a:spcAft>
-              <a:buClrTx/>
-              <a:buSzTx/>
+            <a:pPr marL="185715" indent="-185715" defTabSz="990478">
               <a:buFont typeface="Arial" panose="020B0604020202020204" pitchFamily="34" charset="0"/>
               <a:buChar char="•"/>
-              <a:tabLst/>
               <a:defRPr/>
             </a:pPr>
             <a:r>
@@ -9385,21 +9195,9 @@
             </a:r>
           </a:p>
           <a:p>
-            <a:pPr marL="171450" marR="0" lvl="0" indent="-171450" algn="l" defTabSz="914400" rtl="0" eaLnBrk="1" fontAlgn="auto" latinLnBrk="0" hangingPunct="1">
-              <a:lnSpc>
-                <a:spcPct val="100000"/>
-              </a:lnSpc>
-              <a:spcBef>
-                <a:spcPts val="0"/>
-              </a:spcBef>
-              <a:spcAft>
-                <a:spcPts val="0"/>
-              </a:spcAft>
-              <a:buClrTx/>
-              <a:buSzTx/>
+            <a:pPr marL="185715" indent="-185715" defTabSz="990478">
               <a:buFont typeface="Arial" panose="020B0604020202020204" pitchFamily="34" charset="0"/>
               <a:buChar char="•"/>
-              <a:tabLst/>
               <a:defRPr/>
             </a:pPr>
             <a:r>
@@ -9510,10 +9308,6 @@
           <a:bodyPr/>
           <a:lstStyle/>
           <a:p>
-            <a:pPr marL="0" indent="0">
-              <a:buFont typeface="Arial" panose="020B0604020202020204" pitchFamily="34" charset="0"/>
-              <a:buNone/>
-            </a:pPr>
             <a:r>
               <a:rPr lang="de-DE" dirty="0" smtClean="0"/>
               <a:t># Testpyramide (von</a:t>
@@ -9533,7 +9327,7 @@
             <a:endParaRPr lang="de-DE" baseline="0" dirty="0" smtClean="0"/>
           </a:p>
           <a:p>
-            <a:pPr marL="171450" lvl="0" indent="-171450">
+            <a:pPr marL="185715" indent="-185715">
               <a:buFont typeface="Arial" panose="020B0604020202020204" pitchFamily="34" charset="0"/>
               <a:buChar char="•"/>
             </a:pPr>
@@ -9543,17 +9337,13 @@
             </a:r>
           </a:p>
           <a:p>
-            <a:pPr marL="628650" lvl="1" indent="-171450">
+            <a:pPr marL="680954" lvl="1" indent="-185715">
               <a:buFont typeface="Arial" panose="020B0604020202020204" pitchFamily="34" charset="0"/>
               <a:buChar char="•"/>
             </a:pPr>
             <a:endParaRPr lang="de-DE" baseline="0" dirty="0" smtClean="0"/>
           </a:p>
           <a:p>
-            <a:pPr marL="0" indent="0">
-              <a:buFont typeface="Arial" panose="020B0604020202020204" pitchFamily="34" charset="0"/>
-              <a:buNone/>
-            </a:pPr>
             <a:r>
               <a:rPr lang="de-DE" baseline="0" dirty="0" smtClean="0"/>
               <a:t># </a:t>
@@ -9565,7 +9355,7 @@
             <a:endParaRPr lang="de-DE" baseline="0" dirty="0" smtClean="0"/>
           </a:p>
           <a:p>
-            <a:pPr marL="171450" lvl="0" indent="-171450">
+            <a:pPr marL="185715" indent="-185715">
               <a:buFont typeface="Arial" panose="020B0604020202020204" pitchFamily="34" charset="0"/>
               <a:buChar char="•"/>
             </a:pPr>
@@ -9575,7 +9365,7 @@
             </a:r>
           </a:p>
           <a:p>
-            <a:pPr marL="171450" lvl="0" indent="-171450">
+            <a:pPr marL="185715" indent="-185715">
               <a:buFont typeface="Arial" panose="020B0604020202020204" pitchFamily="34" charset="0"/>
               <a:buChar char="•"/>
             </a:pPr>
@@ -9585,7 +9375,7 @@
             </a:r>
           </a:p>
           <a:p>
-            <a:pPr marL="171450" lvl="0" indent="-171450">
+            <a:pPr marL="185715" indent="-185715">
               <a:buFont typeface="Arial" panose="020B0604020202020204" pitchFamily="34" charset="0"/>
               <a:buChar char="•"/>
             </a:pPr>
@@ -9595,24 +9385,20 @@
             </a:r>
           </a:p>
           <a:p>
-            <a:pPr marL="628650" lvl="1" indent="-171450">
+            <a:pPr marL="680954" lvl="1" indent="-185715">
               <a:buFont typeface="Arial" panose="020B0604020202020204" pitchFamily="34" charset="0"/>
               <a:buChar char="•"/>
             </a:pPr>
             <a:endParaRPr lang="de-DE" baseline="0" dirty="0" smtClean="0"/>
           </a:p>
           <a:p>
-            <a:pPr marL="0" indent="0">
-              <a:buFont typeface="Arial" panose="020B0604020202020204" pitchFamily="34" charset="0"/>
-              <a:buNone/>
-            </a:pPr>
             <a:r>
               <a:rPr lang="de-DE" baseline="0" dirty="0" smtClean="0"/>
               <a:t># Integrationstests</a:t>
             </a:r>
           </a:p>
           <a:p>
-            <a:pPr marL="171450" lvl="0" indent="-171450">
+            <a:pPr marL="185715" indent="-185715">
               <a:buFont typeface="Arial" panose="020B0604020202020204" pitchFamily="34" charset="0"/>
               <a:buChar char="•"/>
             </a:pPr>
@@ -9622,24 +9408,20 @@
             </a:r>
           </a:p>
           <a:p>
-            <a:pPr marL="171450" lvl="0" indent="-171450">
+            <a:pPr marL="185715" indent="-185715">
               <a:buFont typeface="Arial" panose="020B0604020202020204" pitchFamily="34" charset="0"/>
               <a:buChar char="•"/>
             </a:pPr>
             <a:endParaRPr lang="de-DE" baseline="0" dirty="0" smtClean="0"/>
           </a:p>
           <a:p>
-            <a:pPr marL="0" indent="0">
-              <a:buFont typeface="Arial" panose="020B0604020202020204" pitchFamily="34" charset="0"/>
-              <a:buNone/>
-            </a:pPr>
             <a:r>
               <a:rPr lang="de-DE" baseline="0" dirty="0" smtClean="0"/>
               <a:t># Akzeptanztests</a:t>
             </a:r>
           </a:p>
           <a:p>
-            <a:pPr marL="171450" lvl="0" indent="-171450">
+            <a:pPr marL="185715" indent="-185715">
               <a:buFont typeface="Arial" panose="020B0604020202020204" pitchFamily="34" charset="0"/>
               <a:buChar char="•"/>
             </a:pPr>
@@ -9649,7 +9431,7 @@
             </a:r>
           </a:p>
           <a:p>
-            <a:pPr marL="171450" lvl="0" indent="-171450">
+            <a:pPr marL="185715" indent="-185715">
               <a:buFont typeface="Arial" panose="020B0604020202020204" pitchFamily="34" charset="0"/>
               <a:buChar char="•"/>
             </a:pPr>
@@ -9659,21 +9441,9 @@
             </a:r>
           </a:p>
           <a:p>
-            <a:pPr marL="171450" marR="0" lvl="0" indent="-171450" algn="l" defTabSz="914400" rtl="0" eaLnBrk="1" fontAlgn="auto" latinLnBrk="0" hangingPunct="1">
-              <a:lnSpc>
-                <a:spcPct val="100000"/>
-              </a:lnSpc>
-              <a:spcBef>
-                <a:spcPts val="0"/>
-              </a:spcBef>
-              <a:spcAft>
-                <a:spcPts val="0"/>
-              </a:spcAft>
-              <a:buClrTx/>
-              <a:buSzTx/>
+            <a:pPr marL="185715" indent="-185715" defTabSz="990478">
               <a:buFont typeface="Arial" panose="020B0604020202020204" pitchFamily="34" charset="0"/>
               <a:buChar char="•"/>
-              <a:tabLst/>
               <a:defRPr/>
             </a:pPr>
             <a:r>
@@ -9690,21 +9460,9 @@
             </a:r>
           </a:p>
           <a:p>
-            <a:pPr marL="171450" marR="0" lvl="0" indent="-171450" algn="l" defTabSz="914400" rtl="0" eaLnBrk="1" fontAlgn="auto" latinLnBrk="0" hangingPunct="1">
-              <a:lnSpc>
-                <a:spcPct val="100000"/>
-              </a:lnSpc>
-              <a:spcBef>
-                <a:spcPts val="0"/>
-              </a:spcBef>
-              <a:spcAft>
-                <a:spcPts val="0"/>
-              </a:spcAft>
-              <a:buClrTx/>
-              <a:buSzTx/>
+            <a:pPr marL="185715" indent="-185715" defTabSz="990478">
               <a:buFont typeface="Arial" panose="020B0604020202020204" pitchFamily="34" charset="0"/>
               <a:buChar char="•"/>
-              <a:tabLst/>
               <a:defRPr/>
             </a:pPr>
             <a:r>
@@ -9992,10 +9750,6 @@
           <a:bodyPr/>
           <a:lstStyle/>
           <a:p>
-            <a:pPr marL="0" indent="0">
-              <a:buFont typeface="+mj-lt"/>
-              <a:buNone/>
-            </a:pPr>
             <a:r>
               <a:rPr lang="de-DE" dirty="0" smtClean="0"/>
               <a:t># Requirments</a:t>
@@ -10006,7 +9760,7 @@
             </a:r>
           </a:p>
           <a:p>
-            <a:pPr marL="228600" lvl="0" indent="-228600">
+            <a:pPr marL="247620" indent="-247620">
               <a:buFont typeface="Arial" panose="020B0604020202020204" pitchFamily="34" charset="0"/>
               <a:buChar char="•"/>
             </a:pPr>
@@ -10016,7 +9770,7 @@
             </a:r>
           </a:p>
           <a:p>
-            <a:pPr marL="228600" lvl="0" indent="-228600">
+            <a:pPr marL="247620" indent="-247620">
               <a:buFont typeface="Arial" panose="020B0604020202020204" pitchFamily="34" charset="0"/>
               <a:buChar char="•"/>
             </a:pPr>
@@ -10026,7 +9780,7 @@
             </a:r>
           </a:p>
           <a:p>
-            <a:pPr marL="228600" lvl="0" indent="-228600">
+            <a:pPr marL="247620" indent="-247620">
               <a:buFont typeface="Arial" panose="020B0604020202020204" pitchFamily="34" charset="0"/>
               <a:buChar char="•"/>
             </a:pPr>
@@ -10036,24 +9790,20 @@
             </a:r>
           </a:p>
           <a:p>
-            <a:pPr marL="228600" lvl="0" indent="-228600">
+            <a:pPr marL="247620" indent="-247620">
               <a:buFont typeface="Arial" panose="020B0604020202020204" pitchFamily="34" charset="0"/>
               <a:buChar char="•"/>
             </a:pPr>
             <a:endParaRPr lang="de-DE" baseline="0" dirty="0" smtClean="0"/>
           </a:p>
           <a:p>
-            <a:pPr marL="0" lvl="0" indent="0">
-              <a:buFont typeface="+mj-lt"/>
-              <a:buNone/>
-            </a:pPr>
             <a:r>
               <a:rPr lang="de-DE" baseline="0" dirty="0" smtClean="0"/>
               <a:t># Testautomatisierung</a:t>
             </a:r>
           </a:p>
           <a:p>
-            <a:pPr marL="228600" lvl="0" indent="-228600">
+            <a:pPr marL="247620" indent="-247620">
               <a:buFont typeface="Arial" panose="020B0604020202020204" pitchFamily="34" charset="0"/>
               <a:buChar char="•"/>
             </a:pPr>
@@ -10063,7 +9813,7 @@
             </a:r>
           </a:p>
           <a:p>
-            <a:pPr marL="228600" lvl="0" indent="-228600">
+            <a:pPr marL="247620" indent="-247620">
               <a:buFont typeface="Arial" panose="020B0604020202020204" pitchFamily="34" charset="0"/>
               <a:buChar char="•"/>
             </a:pPr>
@@ -10073,24 +9823,20 @@
             </a:r>
           </a:p>
           <a:p>
-            <a:pPr marL="228600" lvl="0" indent="-228600">
+            <a:pPr marL="247620" indent="-247620">
               <a:buFont typeface="Arial" panose="020B0604020202020204" pitchFamily="34" charset="0"/>
               <a:buChar char="•"/>
             </a:pPr>
             <a:endParaRPr lang="de-DE" baseline="0" dirty="0" smtClean="0"/>
           </a:p>
           <a:p>
-            <a:pPr marL="0" lvl="0" indent="0">
-              <a:buFont typeface="+mj-lt"/>
-              <a:buNone/>
-            </a:pPr>
             <a:r>
               <a:rPr lang="de-DE" baseline="0" dirty="0" smtClean="0"/>
               <a:t># Implementierung</a:t>
             </a:r>
           </a:p>
           <a:p>
-            <a:pPr marL="171450" lvl="0" indent="-171450">
+            <a:pPr marL="185715" indent="-185715">
               <a:buFont typeface="Arial" panose="020B0604020202020204" pitchFamily="34" charset="0"/>
               <a:buChar char="•"/>
             </a:pPr>
@@ -10100,7 +9846,7 @@
             </a:r>
           </a:p>
           <a:p>
-            <a:pPr marL="171450" lvl="0" indent="-171450">
+            <a:pPr marL="185715" indent="-185715">
               <a:buFont typeface="Arial" panose="020B0604020202020204" pitchFamily="34" charset="0"/>
               <a:buChar char="•"/>
             </a:pPr>
@@ -10110,27 +9856,19 @@
             </a:r>
           </a:p>
           <a:p>
-            <a:pPr marL="685800" lvl="1" indent="-228600">
+            <a:pPr marL="742859" lvl="1" indent="-247620">
               <a:buFont typeface="Arial" panose="020B0604020202020204" pitchFamily="34" charset="0"/>
               <a:buChar char="•"/>
             </a:pPr>
             <a:endParaRPr lang="de-DE" baseline="0" dirty="0" smtClean="0"/>
           </a:p>
           <a:p>
-            <a:pPr marL="0" lvl="0" indent="0">
-              <a:buFont typeface="Arial" panose="020B0604020202020204" pitchFamily="34" charset="0"/>
-              <a:buNone/>
-            </a:pPr>
             <a:r>
               <a:rPr lang="de-DE" baseline="0" dirty="0" smtClean="0"/>
               <a:t># Verfeinerung der Inhalte u. Strukturen der ausf. Spezifikation =&gt; fachliche Sprache (Domäne) + Komponenten für Testautomatisierung</a:t>
             </a:r>
           </a:p>
           <a:p>
-            <a:pPr marL="0" lvl="0" indent="0">
-              <a:buFont typeface="Arial" panose="020B0604020202020204" pitchFamily="34" charset="0"/>
-              <a:buNone/>
-            </a:pPr>
             <a:r>
               <a:rPr lang="de-DE" baseline="0" dirty="0" smtClean="0"/>
               <a:t># Continuous Validation =&gt; automatisierte Akzeptanztests die fest verdrahtet mit Spec sind =&gt; lebendige Dokumentation</a:t>
@@ -10305,69 +10043,53 @@
           <a:lstStyle/>
           <a:p>
             <a:r>
-              <a:rPr lang="de-DE" sz="1400" b="1" dirty="0" smtClean="0">
-                <a:latin typeface="AA Zuehlke" pitchFamily="2" charset="0"/>
-              </a:rPr>
+              <a:rPr lang="de-DE" sz="1500" b="1" dirty="0"/>
               <a:t>Business Rules</a:t>
             </a:r>
           </a:p>
           <a:p>
-            <a:pPr marL="342900" indent="-342900">
+            <a:pPr marL="371429" indent="-371429">
               <a:buFont typeface="Arial" panose="020B0604020202020204" pitchFamily="34" charset="0"/>
               <a:buChar char="•"/>
             </a:pPr>
             <a:r>
-              <a:rPr lang="de-DE" sz="1200" dirty="0" smtClean="0">
-                <a:latin typeface="AA Zuehlke" pitchFamily="2" charset="0"/>
-              </a:rPr>
+              <a:rPr lang="de-DE" sz="1300" dirty="0"/>
               <a:t>Erste beiden Wörter mit Komma getrennt hinten anhängen</a:t>
             </a:r>
           </a:p>
           <a:p>
-            <a:pPr marL="342900" indent="-342900">
+            <a:pPr marL="371429" indent="-371429">
               <a:buFont typeface="Arial" panose="020B0604020202020204" pitchFamily="34" charset="0"/>
               <a:buChar char="•"/>
             </a:pPr>
             <a:r>
-              <a:rPr lang="de-DE" sz="1200" dirty="0" smtClean="0">
-                <a:latin typeface="AA Zuehlke" pitchFamily="2" charset="0"/>
-              </a:rPr>
+              <a:rPr lang="de-DE" sz="1300" dirty="0"/>
               <a:t>Falles Eingabe mit Fragezeichen endet, „</a:t>
             </a:r>
             <a:r>
-              <a:rPr lang="de-DE" sz="1200" dirty="0" err="1" smtClean="0">
-                <a:latin typeface="AA Zuehlke" pitchFamily="2" charset="0"/>
-              </a:rPr>
+              <a:rPr lang="de-DE" sz="1300" dirty="0" err="1"/>
               <a:t>Hmmm</a:t>
             </a:r>
             <a:r>
-              <a:rPr lang="de-DE" sz="1200" dirty="0" smtClean="0">
-                <a:latin typeface="AA Zuehlke" pitchFamily="2" charset="0"/>
-              </a:rPr>
+              <a:rPr lang="de-DE" sz="1300" dirty="0"/>
               <a:t>…?“ anhängen</a:t>
             </a:r>
           </a:p>
           <a:p>
-            <a:pPr marL="342900" indent="-342900">
+            <a:pPr marL="371429" indent="-371429">
               <a:buFont typeface="Arial" panose="020B0604020202020204" pitchFamily="34" charset="0"/>
               <a:buChar char="•"/>
             </a:pPr>
             <a:r>
-              <a:rPr lang="de-DE" sz="1200" dirty="0" smtClean="0">
-                <a:latin typeface="AA Zuehlke" pitchFamily="2" charset="0"/>
-              </a:rPr>
+              <a:rPr lang="de-DE" sz="1300" dirty="0"/>
               <a:t>„</a:t>
             </a:r>
             <a:r>
-              <a:rPr lang="de-DE" sz="1200" dirty="0" err="1" smtClean="0">
-                <a:latin typeface="AA Zuehlke" pitchFamily="2" charset="0"/>
-              </a:rPr>
+              <a:rPr lang="de-DE" sz="1300" dirty="0" err="1"/>
               <a:t>yes</a:t>
             </a:r>
             <a:r>
-              <a:rPr lang="de-DE" sz="1200" dirty="0" smtClean="0">
-                <a:latin typeface="AA Zuehlke" pitchFamily="2" charset="0"/>
-              </a:rPr>
+              <a:rPr lang="de-DE" sz="1300" dirty="0"/>
               <a:t>…“ hinten anhängen</a:t>
             </a:r>
           </a:p>
@@ -15097,26 +14819,26 @@
               <a:buChar char="•"/>
             </a:pPr>
             <a:r>
-              <a:rPr lang="de-DE" dirty="0" smtClean="0"/>
-              <a:t>„Single Source </a:t>
-            </a:r>
-            <a:r>
-              <a:rPr lang="de-DE" dirty="0" err="1" smtClean="0"/>
+              <a:rPr lang="de-DE" i="1" dirty="0" smtClean="0"/>
+              <a:t>Single </a:t>
+            </a:r>
+            <a:r>
+              <a:rPr lang="de-DE" i="1" dirty="0" smtClean="0"/>
+              <a:t>Source </a:t>
+            </a:r>
+            <a:r>
+              <a:rPr lang="de-DE" i="1" dirty="0" err="1" smtClean="0"/>
               <a:t>of</a:t>
             </a:r>
             <a:r>
-              <a:rPr lang="de-DE" dirty="0" smtClean="0"/>
+              <a:rPr lang="de-DE" i="1" dirty="0" smtClean="0"/>
               <a:t> </a:t>
             </a:r>
             <a:r>
-              <a:rPr lang="de-DE" dirty="0" err="1" smtClean="0"/>
+              <a:rPr lang="de-DE" i="1" dirty="0" err="1" smtClean="0"/>
               <a:t>Truth</a:t>
             </a:r>
-            <a:r>
-              <a:rPr lang="de-DE" dirty="0" smtClean="0"/>
-              <a:t>“</a:t>
-            </a:r>
-            <a:endParaRPr lang="de-DE" dirty="0"/>
+            <a:endParaRPr lang="de-DE" i="1" dirty="0"/>
           </a:p>
           <a:p>
             <a:pPr marL="608013" lvl="1" indent="-342900">
@@ -37480,7 +37202,19 @@
             </a:pPr>
             <a:r>
               <a:rPr lang="de-DE" sz="2000" dirty="0" smtClean="0"/>
-              <a:t>Keine Page Reloads da gesamte Anwendung innerhalb einer Seite</a:t>
+              <a:t>Keine Page </a:t>
+            </a:r>
+            <a:r>
+              <a:rPr lang="de-DE" sz="2000" dirty="0" err="1" smtClean="0"/>
+              <a:t>Reloads</a:t>
+            </a:r>
+            <a:r>
+              <a:rPr lang="de-DE" sz="2000" dirty="0" smtClean="0"/>
+              <a:t>, </a:t>
+            </a:r>
+            <a:r>
+              <a:rPr lang="de-DE" sz="2000" dirty="0" smtClean="0"/>
+              <a:t>da gesamte Anwendung innerhalb einer Seite</a:t>
             </a:r>
           </a:p>
           <a:p>
@@ -40177,8 +39911,20 @@
               <a:buChar char="•"/>
             </a:pPr>
             <a:r>
+              <a:rPr lang="de-DE" dirty="0" err="1" smtClean="0"/>
+              <a:t>Kollaborativer</a:t>
+            </a:r>
+            <a:r>
               <a:rPr lang="de-DE" dirty="0" smtClean="0"/>
-              <a:t>Kollaborativer Ansatz um fachliche Anforderungen und funktionale</a:t>
+              <a:t> </a:t>
+            </a:r>
+            <a:r>
+              <a:rPr lang="de-DE" dirty="0" smtClean="0"/>
+              <a:t>Ansatz, </a:t>
+            </a:r>
+            <a:r>
+              <a:rPr lang="de-DE" dirty="0" smtClean="0"/>
+              <a:t>um fachliche Anforderungen und funktionale</a:t>
             </a:r>
             <a:r>
               <a:rPr lang="de-DE" dirty="0"/>
@@ -40196,8 +39942,9 @@
             </a:pPr>
             <a:r>
               <a:rPr lang="de-DE" dirty="0" smtClean="0"/>
-              <a:t>Anforderungen werden</a:t>
-            </a:r>
+              <a:t>Anforderungen</a:t>
+            </a:r>
+            <a:endParaRPr lang="de-DE" dirty="0" smtClean="0"/>
           </a:p>
           <a:p>
             <a:pPr marL="608013" lvl="1" indent="-342900">
@@ -40205,9 +39952,22 @@
               <a:buChar char="•"/>
             </a:pPr>
             <a:r>
+              <a:rPr lang="de-DE" dirty="0"/>
+              <a:t>w</a:t>
+            </a:r>
+            <a:r>
               <a:rPr lang="de-DE" dirty="0" smtClean="0"/>
-              <a:t>durch realistische Beispiele illustriert</a:t>
-            </a:r>
+              <a:t>erden durch </a:t>
+            </a:r>
+            <a:r>
+              <a:rPr lang="de-DE" dirty="0" smtClean="0"/>
+              <a:t>realistische Beispiele </a:t>
+            </a:r>
+            <a:r>
+              <a:rPr lang="de-DE" dirty="0" smtClean="0"/>
+              <a:t>illustriert,</a:t>
+            </a:r>
+            <a:endParaRPr lang="de-DE" dirty="0" smtClean="0"/>
           </a:p>
           <a:p>
             <a:pPr marL="608013" lvl="1" indent="-342900">
@@ -40216,7 +39976,25 @@
             </a:pPr>
             <a:r>
               <a:rPr lang="de-DE" dirty="0" smtClean="0"/>
-              <a:t>dienen als Akzeptanztests und werden automatisiert</a:t>
+              <a:t>dienen als </a:t>
+            </a:r>
+            <a:r>
+              <a:rPr lang="de-DE" dirty="0" smtClean="0"/>
+              <a:t>Akzeptanztests und</a:t>
+            </a:r>
+          </a:p>
+          <a:p>
+            <a:pPr marL="608013" lvl="1" indent="-342900">
+              <a:buFont typeface="Arial" panose="020B0604020202020204" pitchFamily="34" charset="0"/>
+              <a:buChar char="•"/>
+            </a:pPr>
+            <a:r>
+              <a:rPr lang="de-DE" dirty="0" smtClean="0"/>
+              <a:t>werden </a:t>
+            </a:r>
+            <a:r>
+              <a:rPr lang="de-DE" dirty="0" smtClean="0"/>
+              <a:t>automatisiert</a:t>
             </a:r>
           </a:p>
         </p:txBody>

</xml_diff>